<commit_message>
Update ModelClassDiagram and UiClassDiagram
</commit_message>
<xml_diff>
--- a/docs/diagrams/ModelComponentClassDiagram.pptx
+++ b/docs/diagrams/ModelComponentClassDiagram.pptx
@@ -208,7 +208,7 @@
           <a:p>
             <a:fld id="{F5CC4B3F-88C1-4FFA-B1B6-F41C21DC6924}" type="datetimeFigureOut">
               <a:rPr lang="en-US" smtClean="0"/>
-              <a:t>6/27/2018</a:t>
+              <a:t>10/18/2018</a:t>
             </a:fld>
             <a:endParaRPr lang="en-US"/>
           </a:p>
@@ -654,7 +654,7 @@
           <a:p>
             <a:fld id="{78C97017-6FC3-485B-9764-EAC9E56C1D49}" type="datetimeFigureOut">
               <a:rPr lang="en-US" smtClean="0"/>
-              <a:t>6/27/2018</a:t>
+              <a:t>10/18/2018</a:t>
             </a:fld>
             <a:endParaRPr lang="en-US"/>
           </a:p>
@@ -822,7 +822,7 @@
           <a:p>
             <a:fld id="{78C97017-6FC3-485B-9764-EAC9E56C1D49}" type="datetimeFigureOut">
               <a:rPr lang="en-US" smtClean="0"/>
-              <a:t>6/27/2018</a:t>
+              <a:t>10/18/2018</a:t>
             </a:fld>
             <a:endParaRPr lang="en-US"/>
           </a:p>
@@ -1000,7 +1000,7 @@
           <a:p>
             <a:fld id="{78C97017-6FC3-485B-9764-EAC9E56C1D49}" type="datetimeFigureOut">
               <a:rPr lang="en-US" smtClean="0"/>
-              <a:t>6/27/2018</a:t>
+              <a:t>10/18/2018</a:t>
             </a:fld>
             <a:endParaRPr lang="en-US"/>
           </a:p>
@@ -1168,7 +1168,7 @@
           <a:p>
             <a:fld id="{78C97017-6FC3-485B-9764-EAC9E56C1D49}" type="datetimeFigureOut">
               <a:rPr lang="en-US" smtClean="0"/>
-              <a:t>6/27/2018</a:t>
+              <a:t>10/18/2018</a:t>
             </a:fld>
             <a:endParaRPr lang="en-US"/>
           </a:p>
@@ -1413,7 +1413,7 @@
           <a:p>
             <a:fld id="{78C97017-6FC3-485B-9764-EAC9E56C1D49}" type="datetimeFigureOut">
               <a:rPr lang="en-US" smtClean="0"/>
-              <a:t>6/27/2018</a:t>
+              <a:t>10/18/2018</a:t>
             </a:fld>
             <a:endParaRPr lang="en-US"/>
           </a:p>
@@ -1698,7 +1698,7 @@
           <a:p>
             <a:fld id="{78C97017-6FC3-485B-9764-EAC9E56C1D49}" type="datetimeFigureOut">
               <a:rPr lang="en-US" smtClean="0"/>
-              <a:t>6/27/2018</a:t>
+              <a:t>10/18/2018</a:t>
             </a:fld>
             <a:endParaRPr lang="en-US"/>
           </a:p>
@@ -2117,7 +2117,7 @@
           <a:p>
             <a:fld id="{78C97017-6FC3-485B-9764-EAC9E56C1D49}" type="datetimeFigureOut">
               <a:rPr lang="en-US" smtClean="0"/>
-              <a:t>6/27/2018</a:t>
+              <a:t>10/18/2018</a:t>
             </a:fld>
             <a:endParaRPr lang="en-US"/>
           </a:p>
@@ -2234,7 +2234,7 @@
           <a:p>
             <a:fld id="{78C97017-6FC3-485B-9764-EAC9E56C1D49}" type="datetimeFigureOut">
               <a:rPr lang="en-US" smtClean="0"/>
-              <a:t>6/27/2018</a:t>
+              <a:t>10/18/2018</a:t>
             </a:fld>
             <a:endParaRPr lang="en-US"/>
           </a:p>
@@ -2329,7 +2329,7 @@
           <a:p>
             <a:fld id="{78C97017-6FC3-485B-9764-EAC9E56C1D49}" type="datetimeFigureOut">
               <a:rPr lang="en-US" smtClean="0"/>
-              <a:t>6/27/2018</a:t>
+              <a:t>10/18/2018</a:t>
             </a:fld>
             <a:endParaRPr lang="en-US"/>
           </a:p>
@@ -2604,7 +2604,7 @@
           <a:p>
             <a:fld id="{78C97017-6FC3-485B-9764-EAC9E56C1D49}" type="datetimeFigureOut">
               <a:rPr lang="en-US" smtClean="0"/>
-              <a:t>6/27/2018</a:t>
+              <a:t>10/18/2018</a:t>
             </a:fld>
             <a:endParaRPr lang="en-US"/>
           </a:p>
@@ -2856,7 +2856,7 @@
           <a:p>
             <a:fld id="{78C97017-6FC3-485B-9764-EAC9E56C1D49}" type="datetimeFigureOut">
               <a:rPr lang="en-US" smtClean="0"/>
-              <a:t>6/27/2018</a:t>
+              <a:t>10/18/2018</a:t>
             </a:fld>
             <a:endParaRPr lang="en-US"/>
           </a:p>
@@ -3067,7 +3067,7 @@
           <a:p>
             <a:fld id="{78C97017-6FC3-485B-9764-EAC9E56C1D49}" type="datetimeFigureOut">
               <a:rPr lang="en-US" smtClean="0"/>
-              <a:t>6/27/2018</a:t>
+              <a:t>10/18/2018</a:t>
             </a:fld>
             <a:endParaRPr lang="en-US"/>
           </a:p>
@@ -3450,8 +3450,8 @@
         </p:nvSpPr>
         <p:spPr>
           <a:xfrm>
-            <a:off x="1119865" y="1600200"/>
-            <a:ext cx="7490735" cy="3124200"/>
+            <a:off x="438374" y="1295400"/>
+            <a:ext cx="8172226" cy="3654740"/>
           </a:xfrm>
           <a:prstGeom prst="roundRect">
             <a:avLst>
@@ -3511,7 +3511,7 @@
         </p:nvSpPr>
         <p:spPr>
           <a:xfrm>
-            <a:off x="2877180" y="3463240"/>
+            <a:off x="2195689" y="3214620"/>
             <a:ext cx="1093635" cy="346760"/>
           </a:xfrm>
           <a:prstGeom prst="rect">
@@ -3570,7 +3570,7 @@
         </p:nvSpPr>
         <p:spPr>
           <a:xfrm rot="16200000">
-            <a:off x="1661548" y="3097750"/>
+            <a:off x="980057" y="2849130"/>
             <a:ext cx="1093635" cy="346760"/>
           </a:xfrm>
           <a:prstGeom prst="rect">
@@ -3633,7 +3633,7 @@
         </p:nvCxnSpPr>
         <p:spPr>
           <a:xfrm rot="5400000" flipH="1" flipV="1">
-            <a:off x="4131507" y="1281685"/>
+            <a:off x="3450016" y="1033065"/>
             <a:ext cx="613122" cy="4459404"/>
           </a:xfrm>
           <a:prstGeom prst="bentConnector3">
@@ -3674,7 +3674,7 @@
         </p:nvSpPr>
         <p:spPr>
           <a:xfrm rot="16200000">
-            <a:off x="956202" y="2861202"/>
+            <a:off x="274711" y="2612582"/>
             <a:ext cx="1093635" cy="346760"/>
           </a:xfrm>
           <a:prstGeom prst="rect">
@@ -3744,7 +3744,7 @@
         </p:nvSpPr>
         <p:spPr>
           <a:xfrm rot="16200000">
-            <a:off x="1626910" y="2952291"/>
+            <a:off x="945419" y="2703671"/>
             <a:ext cx="270504" cy="175523"/>
           </a:xfrm>
           <a:prstGeom prst="triangle">
@@ -3794,7 +3794,7 @@
         </p:nvCxnSpPr>
         <p:spPr>
           <a:xfrm>
-            <a:off x="2609828" y="3636620"/>
+            <a:off x="1928337" y="3388000"/>
             <a:ext cx="267352" cy="0"/>
           </a:xfrm>
           <a:prstGeom prst="straightConnector1">
@@ -3832,7 +3832,7 @@
         </p:nvCxnSpPr>
         <p:spPr>
           <a:xfrm>
-            <a:off x="910091" y="3040053"/>
+            <a:off x="228600" y="2791433"/>
             <a:ext cx="419548" cy="2860"/>
           </a:xfrm>
           <a:prstGeom prst="bentConnector3">
@@ -3877,7 +3877,7 @@
         </p:nvCxnSpPr>
         <p:spPr>
           <a:xfrm flipV="1">
-            <a:off x="1849924" y="3040052"/>
+            <a:off x="1168433" y="2791432"/>
             <a:ext cx="216105" cy="1"/>
           </a:xfrm>
           <a:prstGeom prst="line">
@@ -3916,7 +3916,7 @@
         </p:nvSpPr>
         <p:spPr>
           <a:xfrm>
-            <a:off x="2373780" y="3549930"/>
+            <a:off x="1692289" y="3301310"/>
             <a:ext cx="236048" cy="173380"/>
           </a:xfrm>
           <a:prstGeom prst="flowChartDecision">
@@ -3961,7 +3961,7 @@
         </p:nvSpPr>
         <p:spPr>
           <a:xfrm>
-            <a:off x="2825280" y="2846162"/>
+            <a:off x="2143789" y="2597542"/>
             <a:ext cx="1490560" cy="334856"/>
           </a:xfrm>
           <a:prstGeom prst="rect">
@@ -3994,12 +3994,12 @@
           <a:p>
             <a:pPr algn="ctr"/>
             <a:r>
-              <a:rPr lang="en-US" sz="1050" dirty="0" err="1" smtClean="0">
+              <a:rPr lang="en-US" sz="1050" dirty="0" err="1">
                 <a:solidFill>
                   <a:srgbClr val="7030A0"/>
                 </a:solidFill>
               </a:rPr>
-              <a:t>VersionedAddressBook</a:t>
+              <a:t>VersionedSaveIt</a:t>
             </a:r>
             <a:endParaRPr lang="en-SG" sz="1050" dirty="0">
               <a:solidFill>
@@ -4020,7 +4020,7 @@
         </p:nvCxnSpPr>
         <p:spPr>
           <a:xfrm>
-            <a:off x="2624360" y="3003033"/>
+            <a:off x="1942869" y="2754413"/>
             <a:ext cx="200920" cy="10557"/>
           </a:xfrm>
           <a:prstGeom prst="straightConnector1">
@@ -4058,7 +4058,7 @@
         </p:nvSpPr>
         <p:spPr>
           <a:xfrm>
-            <a:off x="2388312" y="2916343"/>
+            <a:off x="1706821" y="2667723"/>
             <a:ext cx="236048" cy="173380"/>
           </a:xfrm>
           <a:prstGeom prst="flowChartDecision">
@@ -4103,7 +4103,7 @@
         </p:nvSpPr>
         <p:spPr>
           <a:xfrm>
-            <a:off x="4692650" y="2846162"/>
+            <a:off x="4011159" y="2597542"/>
             <a:ext cx="1156969" cy="346760"/>
           </a:xfrm>
           <a:prstGeom prst="rect">
@@ -4141,7 +4141,7 @@
                   <a:srgbClr val="7030A0"/>
                 </a:solidFill>
               </a:rPr>
-              <a:t>UniquePersonList</a:t>
+              <a:t>UniqueIssueList</a:t>
             </a:r>
             <a:endParaRPr lang="en-SG" sz="1050" dirty="0">
               <a:solidFill>
@@ -4159,7 +4159,7 @@
         </p:nvSpPr>
         <p:spPr>
           <a:xfrm>
-            <a:off x="4324972" y="2920532"/>
+            <a:off x="3643481" y="2671912"/>
             <a:ext cx="236048" cy="173380"/>
           </a:xfrm>
           <a:prstGeom prst="flowChartDecision">
@@ -4206,7 +4206,7 @@
         </p:nvSpPr>
         <p:spPr>
           <a:xfrm>
-            <a:off x="6313677" y="2858066"/>
+            <a:off x="5632186" y="2609446"/>
             <a:ext cx="708186" cy="346760"/>
           </a:xfrm>
           <a:prstGeom prst="rect">
@@ -4244,7 +4244,7 @@
                   <a:srgbClr val="7030A0"/>
                 </a:solidFill>
               </a:rPr>
-              <a:t>Person</a:t>
+              <a:t>Issue</a:t>
             </a:r>
             <a:endParaRPr lang="en-SG" sz="1050" dirty="0">
               <a:solidFill>
@@ -4262,7 +4262,7 @@
         </p:nvSpPr>
         <p:spPr>
           <a:xfrm>
-            <a:off x="5858751" y="2941676"/>
+            <a:off x="5177260" y="2693056"/>
             <a:ext cx="236048" cy="173380"/>
           </a:xfrm>
           <a:prstGeom prst="flowChartDecision">
@@ -4310,7 +4310,7 @@
         </p:nvCxnSpPr>
         <p:spPr>
           <a:xfrm>
-            <a:off x="6094799" y="3028366"/>
+            <a:off x="5413308" y="2779746"/>
             <a:ext cx="218878" cy="3080"/>
           </a:xfrm>
           <a:prstGeom prst="bentConnector3">
@@ -4342,14 +4342,61 @@
       </p:cxnSp>
       <p:sp>
         <p:nvSpPr>
-          <p:cNvPr id="76" name="Rectangle 8"/>
+          <p:cNvPr id="78" name="Flowchart: Decision 96"/>
           <p:cNvSpPr/>
           <p:nvPr/>
         </p:nvSpPr>
         <p:spPr>
           <a:xfrm>
-            <a:off x="7712397" y="2564238"/>
-            <a:ext cx="708186" cy="285783"/>
+            <a:off x="6360456" y="2699581"/>
+            <a:ext cx="236048" cy="173380"/>
+          </a:xfrm>
+          <a:prstGeom prst="flowChartDecision">
+            <a:avLst/>
+          </a:prstGeom>
+          <a:solidFill>
+            <a:srgbClr val="7030A0"/>
+          </a:solidFill>
+          <a:ln w="19050">
+            <a:solidFill>
+              <a:srgbClr val="7030A0"/>
+            </a:solidFill>
+          </a:ln>
+          <a:effectLst/>
+        </p:spPr>
+        <p:style>
+          <a:lnRef idx="1">
+            <a:schemeClr val="accent6"/>
+          </a:lnRef>
+          <a:fillRef idx="2">
+            <a:schemeClr val="accent6"/>
+          </a:fillRef>
+          <a:effectRef idx="1">
+            <a:schemeClr val="accent6"/>
+          </a:effectRef>
+          <a:fontRef idx="minor">
+            <a:schemeClr val="dk1"/>
+          </a:fontRef>
+        </p:style>
+        <p:txBody>
+          <a:bodyPr rtlCol="0" anchor="ctr"/>
+          <a:lstStyle/>
+          <a:p>
+            <a:pPr algn="ctr"/>
+            <a:endParaRPr lang="en-US" sz="1050"/>
+          </a:p>
+        </p:txBody>
+      </p:sp>
+      <p:sp>
+        <p:nvSpPr>
+          <p:cNvPr id="80" name="Rectangle 8"/>
+          <p:cNvSpPr/>
+          <p:nvPr/>
+        </p:nvSpPr>
+        <p:spPr>
+          <a:xfrm>
+            <a:off x="7030906" y="2381217"/>
+            <a:ext cx="1122494" cy="285783"/>
           </a:xfrm>
           <a:prstGeom prst="rect">
             <a:avLst/>
@@ -4381,12 +4428,12 @@
           <a:p>
             <a:pPr algn="ctr"/>
             <a:r>
-              <a:rPr lang="en-US" sz="1050" dirty="0">
+              <a:rPr lang="en-US" sz="1050" dirty="0" err="1">
                 <a:solidFill>
                   <a:srgbClr val="7030A0"/>
                 </a:solidFill>
               </a:rPr>
-              <a:t>Name</a:t>
+              <a:t>IssueStatement</a:t>
             </a:r>
             <a:endParaRPr lang="en-SG" sz="1050" dirty="0">
               <a:solidFill>
@@ -4396,65 +4443,20 @@
           </a:p>
         </p:txBody>
       </p:sp>
-      <p:sp>
-        <p:nvSpPr>
-          <p:cNvPr id="78" name="Flowchart: Decision 96"/>
-          <p:cNvSpPr/>
-          <p:nvPr/>
-        </p:nvSpPr>
-        <p:spPr>
-          <a:xfrm>
-            <a:off x="7041947" y="2948201"/>
-            <a:ext cx="236048" cy="173380"/>
-          </a:xfrm>
-          <a:prstGeom prst="flowChartDecision">
-            <a:avLst/>
-          </a:prstGeom>
-          <a:solidFill>
-            <a:srgbClr val="7030A0"/>
-          </a:solidFill>
-          <a:ln w="19050">
-            <a:solidFill>
-              <a:srgbClr val="7030A0"/>
-            </a:solidFill>
-          </a:ln>
-          <a:effectLst/>
-        </p:spPr>
-        <p:style>
-          <a:lnRef idx="1">
-            <a:schemeClr val="accent6"/>
-          </a:lnRef>
-          <a:fillRef idx="2">
-            <a:schemeClr val="accent6"/>
-          </a:fillRef>
-          <a:effectRef idx="1">
-            <a:schemeClr val="accent6"/>
-          </a:effectRef>
-          <a:fontRef idx="minor">
-            <a:schemeClr val="dk1"/>
-          </a:fontRef>
-        </p:style>
-        <p:txBody>
-          <a:bodyPr rtlCol="0" anchor="ctr"/>
-          <a:lstStyle/>
-          <a:p>
-            <a:pPr algn="ctr"/>
-            <a:endParaRPr lang="en-US" sz="1050"/>
-          </a:p>
-        </p:txBody>
-      </p:sp>
       <p:cxnSp>
         <p:nvCxnSpPr>
-          <p:cNvPr id="79" name="Elbow Connector 78"/>
+          <p:cNvPr id="81" name="Elbow Connector 80"/>
           <p:cNvCxnSpPr>
             <a:cxnSpLocks/>
+            <a:stCxn id="78" idx="3"/>
+            <a:endCxn id="80" idx="1"/>
           </p:cNvCxnSpPr>
           <p:nvPr/>
         </p:nvCxnSpPr>
         <p:spPr>
           <a:xfrm flipV="1">
-            <a:off x="7277995" y="2706821"/>
-            <a:ext cx="434402" cy="327761"/>
+            <a:off x="6596504" y="2524109"/>
+            <a:ext cx="434402" cy="262162"/>
           </a:xfrm>
           <a:prstGeom prst="bentConnector3">
             <a:avLst/>
@@ -4485,14 +4487,14 @@
       </p:cxnSp>
       <p:sp>
         <p:nvSpPr>
-          <p:cNvPr id="80" name="Rectangle 8"/>
+          <p:cNvPr id="83" name="Rectangle 8"/>
           <p:cNvSpPr/>
           <p:nvPr/>
         </p:nvSpPr>
         <p:spPr>
           <a:xfrm>
-            <a:off x="7712397" y="2887216"/>
-            <a:ext cx="708186" cy="285783"/>
+            <a:off x="7030906" y="2781934"/>
+            <a:ext cx="916773" cy="285783"/>
           </a:xfrm>
           <a:prstGeom prst="rect">
             <a:avLst/>
@@ -4529,7 +4531,7 @@
                   <a:srgbClr val="7030A0"/>
                 </a:solidFill>
               </a:rPr>
-              <a:t>Phone</a:t>
+              <a:t>Description</a:t>
             </a:r>
             <a:endParaRPr lang="en-SG" sz="1050" dirty="0">
               <a:solidFill>
@@ -4541,17 +4543,18 @@
       </p:sp>
       <p:cxnSp>
         <p:nvCxnSpPr>
-          <p:cNvPr id="81" name="Elbow Connector 80"/>
+          <p:cNvPr id="84" name="Elbow Connector 83"/>
           <p:cNvCxnSpPr>
+            <a:cxnSpLocks/>
             <a:stCxn id="78" idx="3"/>
-            <a:endCxn id="80" idx="1"/>
+            <a:endCxn id="83" idx="1"/>
           </p:cNvCxnSpPr>
           <p:nvPr/>
         </p:nvCxnSpPr>
         <p:spPr>
-          <a:xfrm flipV="1">
-            <a:off x="7277995" y="3030108"/>
-            <a:ext cx="434402" cy="4783"/>
+          <a:xfrm>
+            <a:off x="6596504" y="2786271"/>
+            <a:ext cx="434402" cy="138555"/>
           </a:xfrm>
           <a:prstGeom prst="bentConnector3">
             <a:avLst/>
@@ -4582,13 +4585,13 @@
       </p:cxnSp>
       <p:sp>
         <p:nvSpPr>
-          <p:cNvPr id="83" name="Rectangle 8"/>
+          <p:cNvPr id="85" name="Rectangle 8"/>
           <p:cNvSpPr/>
           <p:nvPr/>
         </p:nvSpPr>
         <p:spPr>
           <a:xfrm>
-            <a:off x="7712397" y="3210194"/>
+            <a:off x="7030906" y="3508458"/>
             <a:ext cx="708186" cy="285783"/>
           </a:xfrm>
           <a:prstGeom prst="rect">
@@ -4626,104 +4629,7 @@
                   <a:srgbClr val="7030A0"/>
                 </a:solidFill>
               </a:rPr>
-              <a:t>Email</a:t>
-            </a:r>
-            <a:endParaRPr lang="en-SG" sz="1050" dirty="0">
-              <a:solidFill>
-                <a:srgbClr val="7030A0"/>
-              </a:solidFill>
-            </a:endParaRPr>
-          </a:p>
-        </p:txBody>
-      </p:sp>
-      <p:cxnSp>
-        <p:nvCxnSpPr>
-          <p:cNvPr id="84" name="Elbow Connector 83"/>
-          <p:cNvCxnSpPr>
-            <a:stCxn id="78" idx="3"/>
-            <a:endCxn id="83" idx="1"/>
-          </p:cNvCxnSpPr>
-          <p:nvPr/>
-        </p:nvCxnSpPr>
-        <p:spPr>
-          <a:xfrm>
-            <a:off x="7277995" y="3034891"/>
-            <a:ext cx="434402" cy="318195"/>
-          </a:xfrm>
-          <a:prstGeom prst="bentConnector3">
-            <a:avLst/>
-          </a:prstGeom>
-          <a:ln w="19050">
-            <a:solidFill>
-              <a:srgbClr val="7030A0"/>
-            </a:solidFill>
-            <a:headEnd type="none" w="med" len="med"/>
-            <a:tailEnd type="arrow" w="med" len="med"/>
-          </a:ln>
-          <a:effectLst/>
-        </p:spPr>
-        <p:style>
-          <a:lnRef idx="1">
-            <a:schemeClr val="accent2"/>
-          </a:lnRef>
-          <a:fillRef idx="2">
-            <a:schemeClr val="accent2"/>
-          </a:fillRef>
-          <a:effectRef idx="1">
-            <a:schemeClr val="accent2"/>
-          </a:effectRef>
-          <a:fontRef idx="minor">
-            <a:schemeClr val="dk1"/>
-          </a:fontRef>
-        </p:style>
-      </p:cxnSp>
-      <p:sp>
-        <p:nvSpPr>
-          <p:cNvPr id="85" name="Rectangle 8"/>
-          <p:cNvSpPr/>
-          <p:nvPr/>
-        </p:nvSpPr>
-        <p:spPr>
-          <a:xfrm>
-            <a:off x="7712397" y="3533171"/>
-            <a:ext cx="708186" cy="285783"/>
-          </a:xfrm>
-          <a:prstGeom prst="rect">
-            <a:avLst/>
-          </a:prstGeom>
-          <a:ln w="19050">
-            <a:solidFill>
-              <a:srgbClr val="7030A0"/>
-            </a:solidFill>
-          </a:ln>
-          <a:effectLst/>
-        </p:spPr>
-        <p:style>
-          <a:lnRef idx="1">
-            <a:schemeClr val="accent4"/>
-          </a:lnRef>
-          <a:fillRef idx="2">
-            <a:schemeClr val="accent4"/>
-          </a:fillRef>
-          <a:effectRef idx="1">
-            <a:schemeClr val="accent4"/>
-          </a:effectRef>
-          <a:fontRef idx="minor">
-            <a:schemeClr val="dk1"/>
-          </a:fontRef>
-        </p:style>
-        <p:txBody>
-          <a:bodyPr rtlCol="0" anchor="ctr"/>
-          <a:lstStyle/>
-          <a:p>
-            <a:pPr algn="ctr"/>
-            <a:r>
-              <a:rPr lang="en-US" sz="1050" dirty="0">
-                <a:solidFill>
-                  <a:srgbClr val="7030A0"/>
-                </a:solidFill>
-              </a:rPr>
-              <a:t>Address</a:t>
+              <a:t>Solution</a:t>
             </a:r>
             <a:endParaRPr lang="en-SG" sz="1050" dirty="0">
               <a:solidFill>
@@ -4744,8 +4650,8 @@
         </p:nvCxnSpPr>
         <p:spPr>
           <a:xfrm>
-            <a:off x="7277995" y="3034891"/>
-            <a:ext cx="434402" cy="641172"/>
+            <a:off x="6596504" y="2786271"/>
+            <a:ext cx="434402" cy="865079"/>
           </a:xfrm>
           <a:prstGeom prst="bentConnector3">
             <a:avLst/>
@@ -4784,7 +4690,7 @@
         </p:nvCxnSpPr>
         <p:spPr>
           <a:xfrm rot="5400000">
-            <a:off x="3553611" y="2687559"/>
+            <a:off x="2872120" y="2438939"/>
             <a:ext cx="293825" cy="5938"/>
           </a:xfrm>
           <a:prstGeom prst="bentConnector3">
@@ -4825,7 +4731,7 @@
         </p:nvSpPr>
         <p:spPr>
           <a:xfrm rot="10800000" flipV="1">
-            <a:off x="3562299" y="2386554"/>
+            <a:off x="2880808" y="2137934"/>
             <a:ext cx="282387" cy="157062"/>
           </a:xfrm>
           <a:prstGeom prst="triangle">
@@ -4873,7 +4779,7 @@
         </p:nvSpPr>
         <p:spPr>
           <a:xfrm>
-            <a:off x="1260922" y="1998350"/>
+            <a:off x="579431" y="1749730"/>
             <a:ext cx="1443661" cy="364396"/>
           </a:xfrm>
           <a:prstGeom prst="rect">
@@ -4926,7 +4832,7 @@
                   <a:srgbClr val="7030A0"/>
                 </a:solidFill>
               </a:rPr>
-              <a:t>ReadOnlyAddressBook</a:t>
+              <a:t>ReadOnlySaveIt</a:t>
             </a:r>
             <a:endParaRPr lang="en-SG" sz="1050" dirty="0">
               <a:solidFill>
@@ -4944,7 +4850,7 @@
         </p:nvSpPr>
         <p:spPr>
           <a:xfrm rot="16200000">
-            <a:off x="6362886" y="3586305"/>
+            <a:off x="5681395" y="3337685"/>
             <a:ext cx="881018" cy="261610"/>
           </a:xfrm>
           <a:prstGeom prst="rect">
@@ -4983,7 +4889,7 @@
         </p:nvSpPr>
         <p:spPr>
           <a:xfrm>
-            <a:off x="2057401" y="4239491"/>
+            <a:off x="1375910" y="3990871"/>
             <a:ext cx="1066800" cy="346760"/>
           </a:xfrm>
           <a:prstGeom prst="rect">
@@ -5023,14 +4929,6 @@
               </a:rPr>
               <a:t>&lt;&lt;interface&gt;&gt;</a:t>
             </a:r>
-            <a:r>
-              <a:rPr lang="en-US" sz="1050">
-                <a:solidFill>
-                  <a:srgbClr val="7030A0"/>
-                </a:solidFill>
-              </a:rPr>
-              <a:t/>
-            </a:r>
             <a:br>
               <a:rPr lang="en-US" sz="1050">
                 <a:solidFill>
@@ -5065,7 +4963,7 @@
         </p:nvCxnSpPr>
         <p:spPr>
           <a:xfrm rot="16200000" flipH="1">
-            <a:off x="1364475" y="3719944"/>
+            <a:off x="682984" y="3471324"/>
             <a:ext cx="831471" cy="554381"/>
           </a:xfrm>
           <a:prstGeom prst="bentConnector2">
@@ -5104,7 +5002,7 @@
         </p:nvSpPr>
         <p:spPr>
           <a:xfrm>
-            <a:off x="4429979" y="3111479"/>
+            <a:off x="3748488" y="2862859"/>
             <a:ext cx="189257" cy="178683"/>
           </a:xfrm>
           <a:prstGeom prst="rect">
@@ -5143,7 +5041,7 @@
         </p:nvSpPr>
         <p:spPr>
           <a:xfrm>
-            <a:off x="6135256" y="3097917"/>
+            <a:off x="5453765" y="2849297"/>
             <a:ext cx="189257" cy="178683"/>
           </a:xfrm>
           <a:prstGeom prst="rect">
@@ -5182,7 +5080,7 @@
         </p:nvSpPr>
         <p:spPr>
           <a:xfrm>
-            <a:off x="2573394" y="2756715"/>
+            <a:off x="1891903" y="2508095"/>
             <a:ext cx="170110" cy="137542"/>
           </a:xfrm>
           <a:prstGeom prst="rect">
@@ -5221,7 +5119,7 @@
         </p:nvSpPr>
         <p:spPr>
           <a:xfrm>
-            <a:off x="2707070" y="3667737"/>
+            <a:off x="2025579" y="3419117"/>
             <a:ext cx="189257" cy="178683"/>
           </a:xfrm>
           <a:prstGeom prst="rect">
@@ -5260,7 +5158,7 @@
         </p:nvSpPr>
         <p:spPr>
           <a:xfrm>
-            <a:off x="6449896" y="3204826"/>
+            <a:off x="5768405" y="2956206"/>
             <a:ext cx="189257" cy="178683"/>
           </a:xfrm>
           <a:prstGeom prst="rect">
@@ -5305,7 +5203,7 @@
         </p:nvSpPr>
         <p:spPr>
           <a:xfrm>
-            <a:off x="7712397" y="2228817"/>
+            <a:off x="7035350" y="2007091"/>
             <a:ext cx="708186" cy="285783"/>
           </a:xfrm>
           <a:prstGeom prst="rect">
@@ -5371,8 +5269,8 @@
         </p:nvCxnSpPr>
         <p:spPr>
           <a:xfrm flipV="1">
-            <a:off x="7277995" y="2371709"/>
-            <a:ext cx="434402" cy="663182"/>
+            <a:off x="6596504" y="2149983"/>
+            <a:ext cx="438846" cy="636288"/>
           </a:xfrm>
           <a:prstGeom prst="bentConnector3">
             <a:avLst>
@@ -5417,7 +5315,7 @@
         </p:nvSpPr>
         <p:spPr>
           <a:xfrm>
-            <a:off x="7466243" y="2255711"/>
+            <a:off x="6784752" y="2007091"/>
             <a:ext cx="189257" cy="178683"/>
           </a:xfrm>
           <a:prstGeom prst="rect">
@@ -5456,7 +5354,7 @@
         </p:nvSpPr>
         <p:spPr>
           <a:xfrm>
-            <a:off x="3170181" y="1998350"/>
+            <a:off x="2488690" y="1749730"/>
             <a:ext cx="1060683" cy="364396"/>
           </a:xfrm>
           <a:prstGeom prst="rect">
@@ -5489,12 +5387,12 @@
           <a:p>
             <a:pPr algn="ctr"/>
             <a:r>
-              <a:rPr lang="en-US" sz="1050" dirty="0" err="1">
+              <a:rPr lang="en-US" sz="1050">
                 <a:solidFill>
                   <a:srgbClr val="7030A0"/>
                 </a:solidFill>
               </a:rPr>
-              <a:t>AddressBook</a:t>
+              <a:t>SaveIt</a:t>
             </a:r>
             <a:endParaRPr lang="en-SG" sz="1050" dirty="0">
               <a:solidFill>
@@ -5515,7 +5413,7 @@
         </p:nvCxnSpPr>
         <p:spPr>
           <a:xfrm>
-            <a:off x="4324972" y="3007222"/>
+            <a:off x="3643481" y="2758602"/>
             <a:ext cx="367678" cy="12320"/>
           </a:xfrm>
           <a:prstGeom prst="straightConnector1">
@@ -5553,7 +5451,7 @@
         </p:nvSpPr>
         <p:spPr>
           <a:xfrm rot="16200000">
-            <a:off x="2669073" y="2069158"/>
+            <a:off x="1987582" y="1820538"/>
             <a:ext cx="271014" cy="187417"/>
           </a:xfrm>
           <a:prstGeom prst="triangle">
@@ -5608,7 +5506,7 @@
         </p:nvCxnSpPr>
         <p:spPr>
           <a:xfrm>
-            <a:off x="2898289" y="2177727"/>
+            <a:off x="2216798" y="1929107"/>
             <a:ext cx="271892" cy="2821"/>
           </a:xfrm>
           <a:prstGeom prst="bentConnector3">
@@ -5641,6 +5539,1164 @@
           </a:fontRef>
         </p:style>
       </p:cxnSp>
+      <p:sp>
+        <p:nvSpPr>
+          <p:cNvPr id="56" name="Rectangle 8">
+            <a:extLst>
+              <a:ext uri="{FF2B5EF4-FFF2-40B4-BE49-F238E27FC236}">
+                <a16:creationId xmlns:a16="http://schemas.microsoft.com/office/drawing/2014/main" id="{692F2406-F4FD-41B0-BD24-AB116624C73B}"/>
+              </a:ext>
+            </a:extLst>
+          </p:cNvPr>
+          <p:cNvSpPr/>
+          <p:nvPr/>
+        </p:nvSpPr>
+        <p:spPr>
+          <a:xfrm>
+            <a:off x="4011159" y="1776329"/>
+            <a:ext cx="1156969" cy="346760"/>
+          </a:xfrm>
+          <a:prstGeom prst="rect">
+            <a:avLst/>
+          </a:prstGeom>
+          <a:ln w="19050">
+            <a:solidFill>
+              <a:srgbClr val="7030A0"/>
+            </a:solidFill>
+          </a:ln>
+          <a:effectLst/>
+        </p:spPr>
+        <p:style>
+          <a:lnRef idx="1">
+            <a:schemeClr val="accent4"/>
+          </a:lnRef>
+          <a:fillRef idx="2">
+            <a:schemeClr val="accent4"/>
+          </a:fillRef>
+          <a:effectRef idx="1">
+            <a:schemeClr val="accent4"/>
+          </a:effectRef>
+          <a:fontRef idx="minor">
+            <a:schemeClr val="dk1"/>
+          </a:fontRef>
+        </p:style>
+        <p:txBody>
+          <a:bodyPr rtlCol="0" anchor="ctr"/>
+          <a:lstStyle/>
+          <a:p>
+            <a:pPr algn="ctr"/>
+            <a:r>
+              <a:rPr lang="en-US" sz="1050" dirty="0" err="1">
+                <a:solidFill>
+                  <a:srgbClr val="7030A0"/>
+                </a:solidFill>
+              </a:rPr>
+              <a:t>UniqueTagList</a:t>
+            </a:r>
+            <a:endParaRPr lang="en-SG" sz="1050" dirty="0">
+              <a:solidFill>
+                <a:srgbClr val="7030A0"/>
+              </a:solidFill>
+            </a:endParaRPr>
+          </a:p>
+        </p:txBody>
+      </p:sp>
+      <p:sp>
+        <p:nvSpPr>
+          <p:cNvPr id="59" name="Flowchart: Decision 96">
+            <a:extLst>
+              <a:ext uri="{FF2B5EF4-FFF2-40B4-BE49-F238E27FC236}">
+                <a16:creationId xmlns:a16="http://schemas.microsoft.com/office/drawing/2014/main" id="{08B2921B-2B62-4EDB-B015-3866252FA354}"/>
+              </a:ext>
+            </a:extLst>
+          </p:cNvPr>
+          <p:cNvSpPr/>
+          <p:nvPr/>
+        </p:nvSpPr>
+        <p:spPr>
+          <a:xfrm>
+            <a:off x="5183162" y="1858304"/>
+            <a:ext cx="236048" cy="173380"/>
+          </a:xfrm>
+          <a:prstGeom prst="flowChartDecision">
+            <a:avLst/>
+          </a:prstGeom>
+          <a:solidFill>
+            <a:srgbClr val="7030A0"/>
+          </a:solidFill>
+          <a:ln w="19050">
+            <a:solidFill>
+              <a:srgbClr val="7030A0"/>
+            </a:solidFill>
+          </a:ln>
+          <a:effectLst/>
+        </p:spPr>
+        <p:style>
+          <a:lnRef idx="1">
+            <a:schemeClr val="accent6"/>
+          </a:lnRef>
+          <a:fillRef idx="2">
+            <a:schemeClr val="accent6"/>
+          </a:fillRef>
+          <a:effectRef idx="1">
+            <a:schemeClr val="accent6"/>
+          </a:effectRef>
+          <a:fontRef idx="minor">
+            <a:schemeClr val="dk1"/>
+          </a:fontRef>
+        </p:style>
+        <p:txBody>
+          <a:bodyPr rtlCol="0" anchor="ctr"/>
+          <a:lstStyle/>
+          <a:p>
+            <a:pPr algn="ctr"/>
+            <a:endParaRPr lang="en-US" sz="1050"/>
+          </a:p>
+        </p:txBody>
+      </p:sp>
+      <p:cxnSp>
+        <p:nvCxnSpPr>
+          <p:cNvPr id="67" name="Straight Arrow Connector 66">
+            <a:extLst>
+              <a:ext uri="{FF2B5EF4-FFF2-40B4-BE49-F238E27FC236}">
+                <a16:creationId xmlns:a16="http://schemas.microsoft.com/office/drawing/2014/main" id="{843C2241-BD29-4E03-8ED0-307412405014}"/>
+              </a:ext>
+            </a:extLst>
+          </p:cNvPr>
+          <p:cNvCxnSpPr/>
+          <p:nvPr/>
+        </p:nvCxnSpPr>
+        <p:spPr>
+          <a:xfrm>
+            <a:off x="5269926" y="1948860"/>
+            <a:ext cx="367678" cy="12320"/>
+          </a:xfrm>
+          <a:prstGeom prst="straightConnector1">
+            <a:avLst/>
+          </a:prstGeom>
+          <a:ln w="19050">
+            <a:solidFill>
+              <a:srgbClr val="7030A0"/>
+            </a:solidFill>
+            <a:headEnd type="none" w="med" len="med"/>
+            <a:tailEnd type="arrow" w="med" len="med"/>
+          </a:ln>
+          <a:effectLst/>
+        </p:spPr>
+        <p:style>
+          <a:lnRef idx="1">
+            <a:schemeClr val="accent2"/>
+          </a:lnRef>
+          <a:fillRef idx="2">
+            <a:schemeClr val="accent2"/>
+          </a:fillRef>
+          <a:effectRef idx="1">
+            <a:schemeClr val="accent2"/>
+          </a:effectRef>
+          <a:fontRef idx="minor">
+            <a:schemeClr val="dk1"/>
+          </a:fontRef>
+        </p:style>
+      </p:cxnSp>
+      <p:sp>
+        <p:nvSpPr>
+          <p:cNvPr id="71" name="Rectangle 8">
+            <a:extLst>
+              <a:ext uri="{FF2B5EF4-FFF2-40B4-BE49-F238E27FC236}">
+                <a16:creationId xmlns:a16="http://schemas.microsoft.com/office/drawing/2014/main" id="{D745FA28-BBCA-40AB-99E7-E81D0603B1EF}"/>
+              </a:ext>
+            </a:extLst>
+          </p:cNvPr>
+          <p:cNvSpPr/>
+          <p:nvPr/>
+        </p:nvSpPr>
+        <p:spPr>
+          <a:xfrm>
+            <a:off x="5642908" y="1768266"/>
+            <a:ext cx="708186" cy="346760"/>
+          </a:xfrm>
+          <a:prstGeom prst="rect">
+            <a:avLst/>
+          </a:prstGeom>
+          <a:ln w="19050">
+            <a:solidFill>
+              <a:srgbClr val="7030A0"/>
+            </a:solidFill>
+          </a:ln>
+          <a:effectLst/>
+        </p:spPr>
+        <p:style>
+          <a:lnRef idx="1">
+            <a:schemeClr val="accent4"/>
+          </a:lnRef>
+          <a:fillRef idx="2">
+            <a:schemeClr val="accent4"/>
+          </a:fillRef>
+          <a:effectRef idx="1">
+            <a:schemeClr val="accent4"/>
+          </a:effectRef>
+          <a:fontRef idx="minor">
+            <a:schemeClr val="dk1"/>
+          </a:fontRef>
+        </p:style>
+        <p:txBody>
+          <a:bodyPr rtlCol="0" anchor="ctr"/>
+          <a:lstStyle/>
+          <a:p>
+            <a:pPr algn="ctr"/>
+            <a:r>
+              <a:rPr lang="en-US" sz="1050" dirty="0">
+                <a:solidFill>
+                  <a:srgbClr val="7030A0"/>
+                </a:solidFill>
+              </a:rPr>
+              <a:t>Tag</a:t>
+            </a:r>
+            <a:endParaRPr lang="en-SG" sz="1050" dirty="0">
+              <a:solidFill>
+                <a:srgbClr val="7030A0"/>
+              </a:solidFill>
+            </a:endParaRPr>
+          </a:p>
+        </p:txBody>
+      </p:sp>
+      <p:sp>
+        <p:nvSpPr>
+          <p:cNvPr id="72" name="Flowchart: Decision 96">
+            <a:extLst>
+              <a:ext uri="{FF2B5EF4-FFF2-40B4-BE49-F238E27FC236}">
+                <a16:creationId xmlns:a16="http://schemas.microsoft.com/office/drawing/2014/main" id="{74AB73E6-7116-4574-8CFC-5DCCF25D837E}"/>
+              </a:ext>
+            </a:extLst>
+          </p:cNvPr>
+          <p:cNvSpPr/>
+          <p:nvPr/>
+        </p:nvSpPr>
+        <p:spPr>
+          <a:xfrm rot="5212322">
+            <a:off x="5900822" y="2408351"/>
+            <a:ext cx="178262" cy="170663"/>
+          </a:xfrm>
+          <a:prstGeom prst="flowChartDecision">
+            <a:avLst/>
+          </a:prstGeom>
+          <a:noFill/>
+          <a:ln w="19050">
+            <a:solidFill>
+              <a:srgbClr val="7030A0"/>
+            </a:solidFill>
+          </a:ln>
+          <a:effectLst/>
+        </p:spPr>
+        <p:style>
+          <a:lnRef idx="1">
+            <a:schemeClr val="accent6"/>
+          </a:lnRef>
+          <a:fillRef idx="2">
+            <a:schemeClr val="accent6"/>
+          </a:fillRef>
+          <a:effectRef idx="1">
+            <a:schemeClr val="accent6"/>
+          </a:effectRef>
+          <a:fontRef idx="minor">
+            <a:schemeClr val="dk1"/>
+          </a:fontRef>
+        </p:style>
+        <p:txBody>
+          <a:bodyPr rtlCol="0" anchor="ctr"/>
+          <a:lstStyle/>
+          <a:p>
+            <a:pPr algn="ctr"/>
+            <a:endParaRPr lang="en-US" sz="1050" dirty="0"/>
+          </a:p>
+        </p:txBody>
+      </p:sp>
+      <p:sp>
+        <p:nvSpPr>
+          <p:cNvPr id="73" name="TextBox 72">
+            <a:extLst>
+              <a:ext uri="{FF2B5EF4-FFF2-40B4-BE49-F238E27FC236}">
+                <a16:creationId xmlns:a16="http://schemas.microsoft.com/office/drawing/2014/main" id="{3383F402-831E-4604-B19E-BD5E75FA968E}"/>
+              </a:ext>
+            </a:extLst>
+          </p:cNvPr>
+          <p:cNvSpPr txBox="1"/>
+          <p:nvPr/>
+        </p:nvSpPr>
+        <p:spPr>
+          <a:xfrm>
+            <a:off x="5344211" y="1756803"/>
+            <a:ext cx="189257" cy="178683"/>
+          </a:xfrm>
+          <a:prstGeom prst="rect">
+            <a:avLst/>
+          </a:prstGeom>
+          <a:noFill/>
+        </p:spPr>
+        <p:txBody>
+          <a:bodyPr wrap="square" lIns="0" tIns="0" rIns="0" bIns="0" rtlCol="0">
+            <a:noAutofit/>
+          </a:bodyPr>
+          <a:lstStyle/>
+          <a:p>
+            <a:pPr algn="ctr"/>
+            <a:r>
+              <a:rPr lang="en-US" sz="1100" dirty="0">
+                <a:solidFill>
+                  <a:srgbClr val="7030A0"/>
+                </a:solidFill>
+              </a:rPr>
+              <a:t>*</a:t>
+            </a:r>
+            <a:endParaRPr lang="en-SG" sz="1100" dirty="0">
+              <a:solidFill>
+                <a:srgbClr val="7030A0"/>
+              </a:solidFill>
+            </a:endParaRPr>
+          </a:p>
+        </p:txBody>
+      </p:sp>
+      <p:cxnSp>
+        <p:nvCxnSpPr>
+          <p:cNvPr id="74" name="Elbow Connector 106">
+            <a:extLst>
+              <a:ext uri="{FF2B5EF4-FFF2-40B4-BE49-F238E27FC236}">
+                <a16:creationId xmlns:a16="http://schemas.microsoft.com/office/drawing/2014/main" id="{D0931DAF-625B-42FD-AE58-A5B7DAE46C73}"/>
+              </a:ext>
+            </a:extLst>
+          </p:cNvPr>
+          <p:cNvCxnSpPr>
+            <a:cxnSpLocks/>
+            <a:stCxn id="51" idx="0"/>
+            <a:endCxn id="56" idx="1"/>
+          </p:cNvCxnSpPr>
+          <p:nvPr/>
+        </p:nvCxnSpPr>
+        <p:spPr>
+          <a:xfrm rot="5400000" flipH="1" flipV="1">
+            <a:off x="3525231" y="2185984"/>
+            <a:ext cx="722203" cy="249654"/>
+          </a:xfrm>
+          <a:prstGeom prst="bentConnector2">
+            <a:avLst/>
+          </a:prstGeom>
+          <a:ln w="19050">
+            <a:solidFill>
+              <a:srgbClr val="7030A0"/>
+            </a:solidFill>
+            <a:prstDash val="solid"/>
+            <a:headEnd type="none" w="med" len="med"/>
+            <a:tailEnd type="arrow" w="med" len="med"/>
+          </a:ln>
+          <a:effectLst/>
+        </p:spPr>
+        <p:style>
+          <a:lnRef idx="1">
+            <a:schemeClr val="accent2"/>
+          </a:lnRef>
+          <a:fillRef idx="2">
+            <a:schemeClr val="accent2"/>
+          </a:fillRef>
+          <a:effectRef idx="1">
+            <a:schemeClr val="accent2"/>
+          </a:effectRef>
+          <a:fontRef idx="minor">
+            <a:schemeClr val="dk1"/>
+          </a:fontRef>
+        </p:style>
+      </p:cxnSp>
+      <p:sp>
+        <p:nvSpPr>
+          <p:cNvPr id="77" name="TextBox 76">
+            <a:extLst>
+              <a:ext uri="{FF2B5EF4-FFF2-40B4-BE49-F238E27FC236}">
+                <a16:creationId xmlns:a16="http://schemas.microsoft.com/office/drawing/2014/main" id="{21CF5891-09AF-4E73-BA4A-D3E4BC0EE346}"/>
+              </a:ext>
+            </a:extLst>
+          </p:cNvPr>
+          <p:cNvSpPr txBox="1"/>
+          <p:nvPr/>
+        </p:nvSpPr>
+        <p:spPr>
+          <a:xfrm>
+            <a:off x="3738109" y="1732580"/>
+            <a:ext cx="170110" cy="137542"/>
+          </a:xfrm>
+          <a:prstGeom prst="rect">
+            <a:avLst/>
+          </a:prstGeom>
+          <a:noFill/>
+        </p:spPr>
+        <p:txBody>
+          <a:bodyPr wrap="square" lIns="0" tIns="0" rIns="0" bIns="0" rtlCol="0">
+            <a:noAutofit/>
+          </a:bodyPr>
+          <a:lstStyle/>
+          <a:p>
+            <a:pPr algn="ctr"/>
+            <a:r>
+              <a:rPr lang="en-US" sz="1100" dirty="0">
+                <a:solidFill>
+                  <a:srgbClr val="7030A0"/>
+                </a:solidFill>
+              </a:rPr>
+              <a:t>1</a:t>
+            </a:r>
+            <a:endParaRPr lang="en-SG" sz="1100" dirty="0">
+              <a:solidFill>
+                <a:srgbClr val="7030A0"/>
+              </a:solidFill>
+            </a:endParaRPr>
+          </a:p>
+        </p:txBody>
+      </p:sp>
+      <p:cxnSp>
+        <p:nvCxnSpPr>
+          <p:cNvPr id="82" name="Elbow Connector 106">
+            <a:extLst>
+              <a:ext uri="{FF2B5EF4-FFF2-40B4-BE49-F238E27FC236}">
+                <a16:creationId xmlns:a16="http://schemas.microsoft.com/office/drawing/2014/main" id="{FA6BEF81-93C7-4805-B49E-FA591745ABF2}"/>
+              </a:ext>
+            </a:extLst>
+          </p:cNvPr>
+          <p:cNvCxnSpPr>
+            <a:cxnSpLocks/>
+            <a:stCxn id="72" idx="1"/>
+          </p:cNvCxnSpPr>
+          <p:nvPr/>
+        </p:nvCxnSpPr>
+        <p:spPr>
+          <a:xfrm rot="16200000" flipV="1">
+            <a:off x="5845528" y="2265122"/>
+            <a:ext cx="278814" cy="309"/>
+          </a:xfrm>
+          <a:prstGeom prst="bentConnector3">
+            <a:avLst>
+              <a:gd name="adj1" fmla="val 50000"/>
+            </a:avLst>
+          </a:prstGeom>
+          <a:ln w="19050">
+            <a:solidFill>
+              <a:srgbClr val="7030A0"/>
+            </a:solidFill>
+            <a:prstDash val="solid"/>
+            <a:headEnd type="none" w="med" len="med"/>
+            <a:tailEnd type="arrow" w="med" len="med"/>
+          </a:ln>
+          <a:effectLst/>
+        </p:spPr>
+        <p:style>
+          <a:lnRef idx="1">
+            <a:schemeClr val="accent2"/>
+          </a:lnRef>
+          <a:fillRef idx="2">
+            <a:schemeClr val="accent2"/>
+          </a:fillRef>
+          <a:effectRef idx="1">
+            <a:schemeClr val="accent2"/>
+          </a:effectRef>
+          <a:fontRef idx="minor">
+            <a:schemeClr val="dk1"/>
+          </a:fontRef>
+        </p:style>
+      </p:cxnSp>
+      <p:sp>
+        <p:nvSpPr>
+          <p:cNvPr id="87" name="TextBox 86">
+            <a:extLst>
+              <a:ext uri="{FF2B5EF4-FFF2-40B4-BE49-F238E27FC236}">
+                <a16:creationId xmlns:a16="http://schemas.microsoft.com/office/drawing/2014/main" id="{70D2A4A1-08C8-4211-ABE5-9B63BEA64F50}"/>
+              </a:ext>
+            </a:extLst>
+          </p:cNvPr>
+          <p:cNvSpPr txBox="1"/>
+          <p:nvPr/>
+        </p:nvSpPr>
+        <p:spPr>
+          <a:xfrm>
+            <a:off x="6063452" y="2163497"/>
+            <a:ext cx="189257" cy="178683"/>
+          </a:xfrm>
+          <a:prstGeom prst="rect">
+            <a:avLst/>
+          </a:prstGeom>
+          <a:noFill/>
+        </p:spPr>
+        <p:txBody>
+          <a:bodyPr wrap="square" lIns="0" tIns="0" rIns="0" bIns="0" rtlCol="0">
+            <a:noAutofit/>
+          </a:bodyPr>
+          <a:lstStyle/>
+          <a:p>
+            <a:pPr algn="ctr"/>
+            <a:r>
+              <a:rPr lang="en-US" sz="1100" dirty="0">
+                <a:solidFill>
+                  <a:srgbClr val="7030A0"/>
+                </a:solidFill>
+              </a:rPr>
+              <a:t>*</a:t>
+            </a:r>
+            <a:endParaRPr lang="en-SG" sz="1100" dirty="0">
+              <a:solidFill>
+                <a:srgbClr val="7030A0"/>
+              </a:solidFill>
+            </a:endParaRPr>
+          </a:p>
+        </p:txBody>
+      </p:sp>
+      <p:cxnSp>
+        <p:nvCxnSpPr>
+          <p:cNvPr id="88" name="Elbow Connector 83">
+            <a:extLst>
+              <a:ext uri="{FF2B5EF4-FFF2-40B4-BE49-F238E27FC236}">
+                <a16:creationId xmlns:a16="http://schemas.microsoft.com/office/drawing/2014/main" id="{27AE761E-D045-4523-91D5-BEB03036586B}"/>
+              </a:ext>
+            </a:extLst>
+          </p:cNvPr>
+          <p:cNvCxnSpPr>
+            <a:cxnSpLocks/>
+            <a:endCxn id="89" idx="1"/>
+          </p:cNvCxnSpPr>
+          <p:nvPr/>
+        </p:nvCxnSpPr>
+        <p:spPr>
+          <a:xfrm rot="16200000" flipH="1">
+            <a:off x="6668889" y="2937677"/>
+            <a:ext cx="499912" cy="210282"/>
+          </a:xfrm>
+          <a:prstGeom prst="bentConnector2">
+            <a:avLst/>
+          </a:prstGeom>
+          <a:ln w="19050">
+            <a:solidFill>
+              <a:srgbClr val="7030A0"/>
+            </a:solidFill>
+            <a:headEnd type="none" w="med" len="med"/>
+            <a:tailEnd type="arrow" w="med" len="med"/>
+          </a:ln>
+          <a:effectLst/>
+        </p:spPr>
+        <p:style>
+          <a:lnRef idx="1">
+            <a:schemeClr val="accent2"/>
+          </a:lnRef>
+          <a:fillRef idx="2">
+            <a:schemeClr val="accent2"/>
+          </a:fillRef>
+          <a:effectRef idx="1">
+            <a:schemeClr val="accent2"/>
+          </a:effectRef>
+          <a:fontRef idx="minor">
+            <a:schemeClr val="dk1"/>
+          </a:fontRef>
+        </p:style>
+      </p:cxnSp>
+      <p:sp>
+        <p:nvSpPr>
+          <p:cNvPr id="89" name="Rectangle 8">
+            <a:extLst>
+              <a:ext uri="{FF2B5EF4-FFF2-40B4-BE49-F238E27FC236}">
+                <a16:creationId xmlns:a16="http://schemas.microsoft.com/office/drawing/2014/main" id="{7015BACF-CF09-4C9C-8D9B-87AACFB7848A}"/>
+              </a:ext>
+            </a:extLst>
+          </p:cNvPr>
+          <p:cNvSpPr/>
+          <p:nvPr/>
+        </p:nvSpPr>
+        <p:spPr>
+          <a:xfrm>
+            <a:off x="7023986" y="3149882"/>
+            <a:ext cx="1395728" cy="285783"/>
+          </a:xfrm>
+          <a:prstGeom prst="rect">
+            <a:avLst/>
+          </a:prstGeom>
+          <a:ln w="19050">
+            <a:solidFill>
+              <a:srgbClr val="7030A0"/>
+            </a:solidFill>
+          </a:ln>
+          <a:effectLst/>
+        </p:spPr>
+        <p:style>
+          <a:lnRef idx="1">
+            <a:schemeClr val="accent4"/>
+          </a:lnRef>
+          <a:fillRef idx="2">
+            <a:schemeClr val="accent4"/>
+          </a:fillRef>
+          <a:effectRef idx="1">
+            <a:schemeClr val="accent4"/>
+          </a:effectRef>
+          <a:fontRef idx="minor">
+            <a:schemeClr val="dk1"/>
+          </a:fontRef>
+        </p:style>
+        <p:txBody>
+          <a:bodyPr rtlCol="0" anchor="ctr"/>
+          <a:lstStyle/>
+          <a:p>
+            <a:pPr algn="ctr"/>
+            <a:r>
+              <a:rPr lang="en-US" sz="1050" dirty="0" err="1">
+                <a:solidFill>
+                  <a:srgbClr val="7030A0"/>
+                </a:solidFill>
+              </a:rPr>
+              <a:t>IssueSearchFrequency</a:t>
+            </a:r>
+            <a:endParaRPr lang="en-SG" sz="1050" dirty="0">
+              <a:solidFill>
+                <a:srgbClr val="7030A0"/>
+              </a:solidFill>
+            </a:endParaRPr>
+          </a:p>
+        </p:txBody>
+      </p:sp>
+      <p:sp>
+        <p:nvSpPr>
+          <p:cNvPr id="90" name="Flowchart: Decision 96">
+            <a:extLst>
+              <a:ext uri="{FF2B5EF4-FFF2-40B4-BE49-F238E27FC236}">
+                <a16:creationId xmlns:a16="http://schemas.microsoft.com/office/drawing/2014/main" id="{55877567-6B04-4947-9DA6-09047A15A8F8}"/>
+              </a:ext>
+            </a:extLst>
+          </p:cNvPr>
+          <p:cNvSpPr/>
+          <p:nvPr/>
+        </p:nvSpPr>
+        <p:spPr>
+          <a:xfrm rot="5055974">
+            <a:off x="7273220" y="3841637"/>
+            <a:ext cx="236048" cy="173380"/>
+          </a:xfrm>
+          <a:prstGeom prst="flowChartDecision">
+            <a:avLst/>
+          </a:prstGeom>
+          <a:solidFill>
+            <a:srgbClr val="7030A0"/>
+          </a:solidFill>
+          <a:ln w="19050">
+            <a:solidFill>
+              <a:srgbClr val="7030A0"/>
+            </a:solidFill>
+          </a:ln>
+          <a:effectLst/>
+        </p:spPr>
+        <p:style>
+          <a:lnRef idx="1">
+            <a:schemeClr val="accent6"/>
+          </a:lnRef>
+          <a:fillRef idx="2">
+            <a:schemeClr val="accent6"/>
+          </a:fillRef>
+          <a:effectRef idx="1">
+            <a:schemeClr val="accent6"/>
+          </a:effectRef>
+          <a:fontRef idx="minor">
+            <a:schemeClr val="dk1"/>
+          </a:fontRef>
+        </p:style>
+        <p:txBody>
+          <a:bodyPr rtlCol="0" anchor="ctr"/>
+          <a:lstStyle/>
+          <a:p>
+            <a:pPr algn="ctr"/>
+            <a:endParaRPr lang="en-US" sz="1050"/>
+          </a:p>
+        </p:txBody>
+      </p:sp>
+      <p:sp>
+        <p:nvSpPr>
+          <p:cNvPr id="91" name="Rectangle 8">
+            <a:extLst>
+              <a:ext uri="{FF2B5EF4-FFF2-40B4-BE49-F238E27FC236}">
+                <a16:creationId xmlns:a16="http://schemas.microsoft.com/office/drawing/2014/main" id="{0901FE0A-4DBA-4F1A-919F-CBDCF266092E}"/>
+              </a:ext>
+            </a:extLst>
+          </p:cNvPr>
+          <p:cNvSpPr/>
+          <p:nvPr/>
+        </p:nvSpPr>
+        <p:spPr>
+          <a:xfrm>
+            <a:off x="6517715" y="4265021"/>
+            <a:ext cx="708186" cy="285783"/>
+          </a:xfrm>
+          <a:prstGeom prst="rect">
+            <a:avLst/>
+          </a:prstGeom>
+          <a:ln w="19050">
+            <a:solidFill>
+              <a:srgbClr val="7030A0"/>
+            </a:solidFill>
+          </a:ln>
+          <a:effectLst/>
+        </p:spPr>
+        <p:style>
+          <a:lnRef idx="1">
+            <a:schemeClr val="accent4"/>
+          </a:lnRef>
+          <a:fillRef idx="2">
+            <a:schemeClr val="accent4"/>
+          </a:fillRef>
+          <a:effectRef idx="1">
+            <a:schemeClr val="accent4"/>
+          </a:effectRef>
+          <a:fontRef idx="minor">
+            <a:schemeClr val="dk1"/>
+          </a:fontRef>
+        </p:style>
+        <p:txBody>
+          <a:bodyPr rtlCol="0" anchor="ctr"/>
+          <a:lstStyle/>
+          <a:p>
+            <a:pPr algn="ctr"/>
+            <a:r>
+              <a:rPr lang="en-US" sz="1050" dirty="0">
+                <a:solidFill>
+                  <a:srgbClr val="7030A0"/>
+                </a:solidFill>
+              </a:rPr>
+              <a:t>Remark</a:t>
+            </a:r>
+            <a:endParaRPr lang="en-SG" sz="1050" dirty="0">
+              <a:solidFill>
+                <a:srgbClr val="7030A0"/>
+              </a:solidFill>
+            </a:endParaRPr>
+          </a:p>
+        </p:txBody>
+      </p:sp>
+      <p:sp>
+        <p:nvSpPr>
+          <p:cNvPr id="92" name="Rectangle 8">
+            <a:extLst>
+              <a:ext uri="{FF2B5EF4-FFF2-40B4-BE49-F238E27FC236}">
+                <a16:creationId xmlns:a16="http://schemas.microsoft.com/office/drawing/2014/main" id="{A39CBCEB-F328-498F-8412-46394C75AF8F}"/>
+              </a:ext>
+            </a:extLst>
+          </p:cNvPr>
+          <p:cNvSpPr/>
+          <p:nvPr/>
+        </p:nvSpPr>
+        <p:spPr>
+          <a:xfrm>
+            <a:off x="7467600" y="4270251"/>
+            <a:ext cx="945439" cy="285783"/>
+          </a:xfrm>
+          <a:prstGeom prst="rect">
+            <a:avLst/>
+          </a:prstGeom>
+          <a:ln w="19050">
+            <a:solidFill>
+              <a:srgbClr val="7030A0"/>
+            </a:solidFill>
+          </a:ln>
+          <a:effectLst/>
+        </p:spPr>
+        <p:style>
+          <a:lnRef idx="1">
+            <a:schemeClr val="accent4"/>
+          </a:lnRef>
+          <a:fillRef idx="2">
+            <a:schemeClr val="accent4"/>
+          </a:fillRef>
+          <a:effectRef idx="1">
+            <a:schemeClr val="accent4"/>
+          </a:effectRef>
+          <a:fontRef idx="minor">
+            <a:schemeClr val="dk1"/>
+          </a:fontRef>
+        </p:style>
+        <p:txBody>
+          <a:bodyPr rtlCol="0" anchor="ctr"/>
+          <a:lstStyle/>
+          <a:p>
+            <a:pPr algn="ctr"/>
+            <a:r>
+              <a:rPr lang="en-US" sz="1050" dirty="0" err="1">
+                <a:solidFill>
+                  <a:srgbClr val="7030A0"/>
+                </a:solidFill>
+              </a:rPr>
+              <a:t>SolutionLink</a:t>
+            </a:r>
+            <a:endParaRPr lang="en-SG" sz="1050" dirty="0">
+              <a:solidFill>
+                <a:srgbClr val="7030A0"/>
+              </a:solidFill>
+            </a:endParaRPr>
+          </a:p>
+        </p:txBody>
+      </p:sp>
+      <p:cxnSp>
+        <p:nvCxnSpPr>
+          <p:cNvPr id="93" name="Elbow Connector 78">
+            <a:extLst>
+              <a:ext uri="{FF2B5EF4-FFF2-40B4-BE49-F238E27FC236}">
+                <a16:creationId xmlns:a16="http://schemas.microsoft.com/office/drawing/2014/main" id="{A8D85117-56C6-40AB-8057-83D3AD9168AA}"/>
+              </a:ext>
+            </a:extLst>
+          </p:cNvPr>
+          <p:cNvCxnSpPr>
+            <a:cxnSpLocks/>
+            <a:stCxn id="90" idx="0"/>
+            <a:endCxn id="92" idx="0"/>
+          </p:cNvCxnSpPr>
+          <p:nvPr/>
+        </p:nvCxnSpPr>
+        <p:spPr>
+          <a:xfrm>
+            <a:off x="7477500" y="3919666"/>
+            <a:ext cx="462820" cy="350585"/>
+          </a:xfrm>
+          <a:prstGeom prst="bentConnector2">
+            <a:avLst/>
+          </a:prstGeom>
+          <a:ln w="19050">
+            <a:solidFill>
+              <a:srgbClr val="7030A0"/>
+            </a:solidFill>
+            <a:headEnd type="none" w="med" len="med"/>
+            <a:tailEnd type="arrow" w="med" len="med"/>
+          </a:ln>
+          <a:effectLst/>
+        </p:spPr>
+        <p:style>
+          <a:lnRef idx="1">
+            <a:schemeClr val="accent2"/>
+          </a:lnRef>
+          <a:fillRef idx="2">
+            <a:schemeClr val="accent2"/>
+          </a:fillRef>
+          <a:effectRef idx="1">
+            <a:schemeClr val="accent2"/>
+          </a:effectRef>
+          <a:fontRef idx="minor">
+            <a:schemeClr val="dk1"/>
+          </a:fontRef>
+        </p:style>
+      </p:cxnSp>
+      <p:cxnSp>
+        <p:nvCxnSpPr>
+          <p:cNvPr id="94" name="Elbow Connector 78">
+            <a:extLst>
+              <a:ext uri="{FF2B5EF4-FFF2-40B4-BE49-F238E27FC236}">
+                <a16:creationId xmlns:a16="http://schemas.microsoft.com/office/drawing/2014/main" id="{B51B579C-F249-4608-93F4-B0482E5DFC5B}"/>
+              </a:ext>
+            </a:extLst>
+          </p:cNvPr>
+          <p:cNvCxnSpPr>
+            <a:cxnSpLocks/>
+            <a:stCxn id="90" idx="2"/>
+            <a:endCxn id="91" idx="0"/>
+          </p:cNvCxnSpPr>
+          <p:nvPr/>
+        </p:nvCxnSpPr>
+        <p:spPr>
+          <a:xfrm rot="10800000" flipV="1">
+            <a:off x="6871808" y="3936987"/>
+            <a:ext cx="433180" cy="328033"/>
+          </a:xfrm>
+          <a:prstGeom prst="bentConnector2">
+            <a:avLst/>
+          </a:prstGeom>
+          <a:ln w="19050">
+            <a:solidFill>
+              <a:srgbClr val="7030A0"/>
+            </a:solidFill>
+            <a:headEnd type="none" w="med" len="med"/>
+            <a:tailEnd type="arrow" w="med" len="med"/>
+          </a:ln>
+          <a:effectLst/>
+        </p:spPr>
+        <p:style>
+          <a:lnRef idx="1">
+            <a:schemeClr val="accent2"/>
+          </a:lnRef>
+          <a:fillRef idx="2">
+            <a:schemeClr val="accent2"/>
+          </a:fillRef>
+          <a:effectRef idx="1">
+            <a:schemeClr val="accent2"/>
+          </a:effectRef>
+          <a:fontRef idx="minor">
+            <a:schemeClr val="dk1"/>
+          </a:fontRef>
+        </p:style>
+      </p:cxnSp>
+      <p:sp>
+        <p:nvSpPr>
+          <p:cNvPr id="95" name="TextBox 94">
+            <a:extLst>
+              <a:ext uri="{FF2B5EF4-FFF2-40B4-BE49-F238E27FC236}">
+                <a16:creationId xmlns:a16="http://schemas.microsoft.com/office/drawing/2014/main" id="{DCB40580-B612-4579-85FD-DD71537590BB}"/>
+              </a:ext>
+            </a:extLst>
+          </p:cNvPr>
+          <p:cNvSpPr txBox="1"/>
+          <p:nvPr/>
+        </p:nvSpPr>
+        <p:spPr>
+          <a:xfrm>
+            <a:off x="6821143" y="2667000"/>
+            <a:ext cx="189257" cy="178683"/>
+          </a:xfrm>
+          <a:prstGeom prst="rect">
+            <a:avLst/>
+          </a:prstGeom>
+          <a:noFill/>
+        </p:spPr>
+        <p:txBody>
+          <a:bodyPr wrap="square" lIns="0" tIns="0" rIns="0" bIns="0" rtlCol="0">
+            <a:noAutofit/>
+          </a:bodyPr>
+          <a:lstStyle/>
+          <a:p>
+            <a:pPr algn="ctr"/>
+            <a:r>
+              <a:rPr lang="en-US" sz="1100" dirty="0">
+                <a:solidFill>
+                  <a:srgbClr val="7030A0"/>
+                </a:solidFill>
+              </a:rPr>
+              <a:t>1</a:t>
+            </a:r>
+            <a:endParaRPr lang="en-SG" sz="1100" dirty="0">
+              <a:solidFill>
+                <a:srgbClr val="7030A0"/>
+              </a:solidFill>
+            </a:endParaRPr>
+          </a:p>
+        </p:txBody>
+      </p:sp>
+      <p:sp>
+        <p:nvSpPr>
+          <p:cNvPr id="96" name="TextBox 95">
+            <a:extLst>
+              <a:ext uri="{FF2B5EF4-FFF2-40B4-BE49-F238E27FC236}">
+                <a16:creationId xmlns:a16="http://schemas.microsoft.com/office/drawing/2014/main" id="{31ED786E-5575-47B0-932B-7322D1F55D19}"/>
+              </a:ext>
+            </a:extLst>
+          </p:cNvPr>
+          <p:cNvSpPr txBox="1"/>
+          <p:nvPr/>
+        </p:nvSpPr>
+        <p:spPr>
+          <a:xfrm>
+            <a:off x="6821143" y="3048000"/>
+            <a:ext cx="189257" cy="178683"/>
+          </a:xfrm>
+          <a:prstGeom prst="rect">
+            <a:avLst/>
+          </a:prstGeom>
+          <a:noFill/>
+        </p:spPr>
+        <p:txBody>
+          <a:bodyPr wrap="square" lIns="0" tIns="0" rIns="0" bIns="0" rtlCol="0">
+            <a:noAutofit/>
+          </a:bodyPr>
+          <a:lstStyle/>
+          <a:p>
+            <a:pPr algn="ctr"/>
+            <a:r>
+              <a:rPr lang="en-US" sz="1100" dirty="0">
+                <a:solidFill>
+                  <a:srgbClr val="7030A0"/>
+                </a:solidFill>
+              </a:rPr>
+              <a:t>1</a:t>
+            </a:r>
+            <a:endParaRPr lang="en-SG" sz="1100" dirty="0">
+              <a:solidFill>
+                <a:srgbClr val="7030A0"/>
+              </a:solidFill>
+            </a:endParaRPr>
+          </a:p>
+        </p:txBody>
+      </p:sp>
+      <p:sp>
+        <p:nvSpPr>
+          <p:cNvPr id="98" name="TextBox 97">
+            <a:extLst>
+              <a:ext uri="{FF2B5EF4-FFF2-40B4-BE49-F238E27FC236}">
+                <a16:creationId xmlns:a16="http://schemas.microsoft.com/office/drawing/2014/main" id="{A2BCD65D-5292-49FE-95CC-86FD52A0EEE4}"/>
+              </a:ext>
+            </a:extLst>
+          </p:cNvPr>
+          <p:cNvSpPr txBox="1"/>
+          <p:nvPr/>
+        </p:nvSpPr>
+        <p:spPr>
+          <a:xfrm>
+            <a:off x="6821143" y="3402717"/>
+            <a:ext cx="189257" cy="178683"/>
+          </a:xfrm>
+          <a:prstGeom prst="rect">
+            <a:avLst/>
+          </a:prstGeom>
+          <a:noFill/>
+        </p:spPr>
+        <p:txBody>
+          <a:bodyPr wrap="square" lIns="0" tIns="0" rIns="0" bIns="0" rtlCol="0">
+            <a:noAutofit/>
+          </a:bodyPr>
+          <a:lstStyle/>
+          <a:p>
+            <a:pPr algn="ctr"/>
+            <a:r>
+              <a:rPr lang="en-US" sz="1100" dirty="0">
+                <a:solidFill>
+                  <a:srgbClr val="7030A0"/>
+                </a:solidFill>
+              </a:rPr>
+              <a:t>1</a:t>
+            </a:r>
+            <a:endParaRPr lang="en-SG" sz="1100" dirty="0">
+              <a:solidFill>
+                <a:srgbClr val="7030A0"/>
+              </a:solidFill>
+            </a:endParaRPr>
+          </a:p>
+        </p:txBody>
+      </p:sp>
+      <p:sp>
+        <p:nvSpPr>
+          <p:cNvPr id="101" name="TextBox 100">
+            <a:extLst>
+              <a:ext uri="{FF2B5EF4-FFF2-40B4-BE49-F238E27FC236}">
+                <a16:creationId xmlns:a16="http://schemas.microsoft.com/office/drawing/2014/main" id="{70F63424-044C-4B39-8927-5571441F9C35}"/>
+              </a:ext>
+            </a:extLst>
+          </p:cNvPr>
+          <p:cNvSpPr txBox="1"/>
+          <p:nvPr/>
+        </p:nvSpPr>
+        <p:spPr>
+          <a:xfrm>
+            <a:off x="6821143" y="2286000"/>
+            <a:ext cx="189257" cy="178683"/>
+          </a:xfrm>
+          <a:prstGeom prst="rect">
+            <a:avLst/>
+          </a:prstGeom>
+          <a:noFill/>
+        </p:spPr>
+        <p:txBody>
+          <a:bodyPr wrap="square" lIns="0" tIns="0" rIns="0" bIns="0" rtlCol="0">
+            <a:noAutofit/>
+          </a:bodyPr>
+          <a:lstStyle/>
+          <a:p>
+            <a:pPr algn="ctr"/>
+            <a:r>
+              <a:rPr lang="en-US" sz="1100" dirty="0">
+                <a:solidFill>
+                  <a:srgbClr val="7030A0"/>
+                </a:solidFill>
+              </a:rPr>
+              <a:t>1</a:t>
+            </a:r>
+            <a:endParaRPr lang="en-SG" sz="1100" dirty="0">
+              <a:solidFill>
+                <a:srgbClr val="7030A0"/>
+              </a:solidFill>
+            </a:endParaRPr>
+          </a:p>
+        </p:txBody>
+      </p:sp>
+      <p:sp>
+        <p:nvSpPr>
+          <p:cNvPr id="102" name="TextBox 101">
+            <a:extLst>
+              <a:ext uri="{FF2B5EF4-FFF2-40B4-BE49-F238E27FC236}">
+                <a16:creationId xmlns:a16="http://schemas.microsoft.com/office/drawing/2014/main" id="{D44BBD60-57A6-4FA9-8F48-429B838CE733}"/>
+              </a:ext>
+            </a:extLst>
+          </p:cNvPr>
+          <p:cNvSpPr txBox="1"/>
+          <p:nvPr/>
+        </p:nvSpPr>
+        <p:spPr>
+          <a:xfrm>
+            <a:off x="6629400" y="4038600"/>
+            <a:ext cx="189257" cy="178683"/>
+          </a:xfrm>
+          <a:prstGeom prst="rect">
+            <a:avLst/>
+          </a:prstGeom>
+          <a:noFill/>
+        </p:spPr>
+        <p:txBody>
+          <a:bodyPr wrap="square" lIns="0" tIns="0" rIns="0" bIns="0" rtlCol="0">
+            <a:noAutofit/>
+          </a:bodyPr>
+          <a:lstStyle/>
+          <a:p>
+            <a:pPr algn="ctr"/>
+            <a:r>
+              <a:rPr lang="en-US" sz="1100" dirty="0">
+                <a:solidFill>
+                  <a:srgbClr val="7030A0"/>
+                </a:solidFill>
+              </a:rPr>
+              <a:t>1</a:t>
+            </a:r>
+            <a:endParaRPr lang="en-SG" sz="1100" dirty="0">
+              <a:solidFill>
+                <a:srgbClr val="7030A0"/>
+              </a:solidFill>
+            </a:endParaRPr>
+          </a:p>
+        </p:txBody>
+      </p:sp>
+      <p:sp>
+        <p:nvSpPr>
+          <p:cNvPr id="103" name="TextBox 102">
+            <a:extLst>
+              <a:ext uri="{FF2B5EF4-FFF2-40B4-BE49-F238E27FC236}">
+                <a16:creationId xmlns:a16="http://schemas.microsoft.com/office/drawing/2014/main" id="{9CFB400A-5BD4-4F7C-A273-9C9D00B4112B}"/>
+              </a:ext>
+            </a:extLst>
+          </p:cNvPr>
+          <p:cNvSpPr txBox="1"/>
+          <p:nvPr/>
+        </p:nvSpPr>
+        <p:spPr>
+          <a:xfrm>
+            <a:off x="8040343" y="4038600"/>
+            <a:ext cx="189257" cy="178683"/>
+          </a:xfrm>
+          <a:prstGeom prst="rect">
+            <a:avLst/>
+          </a:prstGeom>
+          <a:noFill/>
+        </p:spPr>
+        <p:txBody>
+          <a:bodyPr wrap="square" lIns="0" tIns="0" rIns="0" bIns="0" rtlCol="0">
+            <a:noAutofit/>
+          </a:bodyPr>
+          <a:lstStyle/>
+          <a:p>
+            <a:pPr algn="ctr"/>
+            <a:r>
+              <a:rPr lang="en-US" sz="1100" dirty="0">
+                <a:solidFill>
+                  <a:srgbClr val="7030A0"/>
+                </a:solidFill>
+              </a:rPr>
+              <a:t>1</a:t>
+            </a:r>
+            <a:endParaRPr lang="en-SG" sz="1100" dirty="0">
+              <a:solidFill>
+                <a:srgbClr val="7030A0"/>
+              </a:solidFill>
+            </a:endParaRPr>
+          </a:p>
+        </p:txBody>
+      </p:sp>
     </p:spTree>
     <p:extLst>
       <p:ext uri="{BB962C8B-B14F-4D97-AF65-F5344CB8AC3E}">

</xml_diff>